<commit_message>
edit pptx and readme 'sample result'
</commit_message>
<xml_diff>
--- a/AudienceAPI_v2.1.pptx
+++ b/AudienceAPI_v2.1.pptx
@@ -335,7 +335,7 @@
           <a:p>
             <a:fld id="{578B668C-4522-4FD9-AAE0-2F8A75744F0F}" type="datetimeFigureOut">
               <a:rPr lang="zh-TW" altLang="en-US" smtClean="0"/>
-              <a:t>2021/11/10</a:t>
+              <a:t>2021/11/11</a:t>
             </a:fld>
             <a:endParaRPr lang="zh-TW" altLang="en-US"/>
           </a:p>
@@ -556,7 +556,7 @@
           <a:p>
             <a:fld id="{578B668C-4522-4FD9-AAE0-2F8A75744F0F}" type="datetimeFigureOut">
               <a:rPr lang="zh-TW" altLang="en-US" smtClean="0"/>
-              <a:t>2021/11/10</a:t>
+              <a:t>2021/11/11</a:t>
             </a:fld>
             <a:endParaRPr lang="zh-TW" altLang="en-US"/>
           </a:p>
@@ -736,7 +736,7 @@
           <a:p>
             <a:fld id="{578B668C-4522-4FD9-AAE0-2F8A75744F0F}" type="datetimeFigureOut">
               <a:rPr lang="zh-TW" altLang="en-US" smtClean="0"/>
-              <a:t>2021/11/10</a:t>
+              <a:t>2021/11/11</a:t>
             </a:fld>
             <a:endParaRPr lang="zh-TW" altLang="en-US"/>
           </a:p>
@@ -906,7 +906,7 @@
           <a:p>
             <a:fld id="{578B668C-4522-4FD9-AAE0-2F8A75744F0F}" type="datetimeFigureOut">
               <a:rPr lang="zh-TW" altLang="en-US" smtClean="0"/>
-              <a:t>2021/11/10</a:t>
+              <a:t>2021/11/11</a:t>
             </a:fld>
             <a:endParaRPr lang="zh-TW" altLang="en-US"/>
           </a:p>
@@ -1180,7 +1180,7 @@
           <a:p>
             <a:fld id="{578B668C-4522-4FD9-AAE0-2F8A75744F0F}" type="datetimeFigureOut">
               <a:rPr lang="zh-TW" altLang="en-US" smtClean="0"/>
-              <a:t>2021/11/10</a:t>
+              <a:t>2021/11/11</a:t>
             </a:fld>
             <a:endParaRPr lang="zh-TW" altLang="en-US"/>
           </a:p>
@@ -1503,7 +1503,7 @@
           <a:p>
             <a:fld id="{578B668C-4522-4FD9-AAE0-2F8A75744F0F}" type="datetimeFigureOut">
               <a:rPr lang="zh-TW" altLang="en-US" smtClean="0"/>
-              <a:t>2021/11/10</a:t>
+              <a:t>2021/11/11</a:t>
             </a:fld>
             <a:endParaRPr lang="zh-TW" altLang="en-US"/>
           </a:p>
@@ -1927,7 +1927,7 @@
           <a:p>
             <a:fld id="{578B668C-4522-4FD9-AAE0-2F8A75744F0F}" type="datetimeFigureOut">
               <a:rPr lang="zh-TW" altLang="en-US" smtClean="0"/>
-              <a:t>2021/11/10</a:t>
+              <a:t>2021/11/11</a:t>
             </a:fld>
             <a:endParaRPr lang="zh-TW" altLang="en-US"/>
           </a:p>
@@ -2045,7 +2045,7 @@
           <a:p>
             <a:fld id="{578B668C-4522-4FD9-AAE0-2F8A75744F0F}" type="datetimeFigureOut">
               <a:rPr lang="zh-TW" altLang="en-US" smtClean="0"/>
-              <a:t>2021/11/10</a:t>
+              <a:t>2021/11/11</a:t>
             </a:fld>
             <a:endParaRPr lang="zh-TW" altLang="en-US"/>
           </a:p>
@@ -2140,7 +2140,7 @@
           <a:p>
             <a:fld id="{578B668C-4522-4FD9-AAE0-2F8A75744F0F}" type="datetimeFigureOut">
               <a:rPr lang="zh-TW" altLang="en-US" smtClean="0"/>
-              <a:t>2021/11/10</a:t>
+              <a:t>2021/11/11</a:t>
             </a:fld>
             <a:endParaRPr lang="zh-TW" altLang="en-US"/>
           </a:p>
@@ -2430,7 +2430,7 @@
           <a:p>
             <a:fld id="{578B668C-4522-4FD9-AAE0-2F8A75744F0F}" type="datetimeFigureOut">
               <a:rPr lang="zh-TW" altLang="en-US" smtClean="0"/>
-              <a:t>2021/11/10</a:t>
+              <a:t>2021/11/11</a:t>
             </a:fld>
             <a:endParaRPr lang="zh-TW" altLang="en-US"/>
           </a:p>
@@ -2702,7 +2702,7 @@
           <a:p>
             <a:fld id="{578B668C-4522-4FD9-AAE0-2F8A75744F0F}" type="datetimeFigureOut">
               <a:rPr lang="zh-TW" altLang="en-US" smtClean="0"/>
-              <a:t>2021/11/10</a:t>
+              <a:t>2021/11/11</a:t>
             </a:fld>
             <a:endParaRPr lang="zh-TW" altLang="en-US"/>
           </a:p>
@@ -2956,7 +2956,7 @@
           <a:p>
             <a:fld id="{578B668C-4522-4FD9-AAE0-2F8A75744F0F}" type="datetimeFigureOut">
               <a:rPr lang="zh-TW" altLang="en-US" smtClean="0"/>
-              <a:t>2021/11/10</a:t>
+              <a:t>2021/11/11</a:t>
             </a:fld>
             <a:endParaRPr lang="zh-TW" altLang="en-US"/>
           </a:p>
@@ -3469,7 +3469,11 @@
           <a:p>
             <a:r>
               <a:rPr lang="en-US" altLang="zh-TW" dirty="0" smtClean="0"/>
-              <a:t>RD2 Weber Huang 2021-11-10</a:t>
+              <a:t>Weber </a:t>
+            </a:r>
+            <a:r>
+              <a:rPr lang="en-US" altLang="zh-TW" dirty="0" smtClean="0"/>
+              <a:t>Huang 2021-11-10</a:t>
             </a:r>
             <a:endParaRPr lang="zh-TW" altLang="en-US" dirty="0"/>
           </a:p>
@@ -3791,7 +3795,7 @@
           <a:p>
             <a:r>
               <a:rPr lang="zh-TW" altLang="en-US" dirty="0" smtClean="0"/>
-              <a:t>專案部屬需求</a:t>
+              <a:t>專案部屬系統需求</a:t>
             </a:r>
             <a:endParaRPr lang="zh-TW" altLang="en-US" dirty="0"/>
           </a:p>
@@ -3843,7 +3847,7 @@
             </a:r>
             <a:r>
               <a:rPr lang="zh-TW" altLang="en-US" dirty="0" smtClean="0"/>
-              <a:t>不支援平行處理</a:t>
+              <a:t>次要推薦，不支援平行處理</a:t>
             </a:r>
             <a:r>
               <a:rPr lang="en-US" altLang="zh-TW" dirty="0" smtClean="0"/>
@@ -3906,7 +3910,7 @@
             </a:r>
             <a:r>
               <a:rPr lang="zh-TW" altLang="en-US" dirty="0" smtClean="0"/>
-              <a:t>同等或以上</a:t>
+              <a:t>同等或以上記憶體配置</a:t>
             </a:r>
             <a:endParaRPr lang="en-US" altLang="zh-TW" dirty="0" smtClean="0"/>
           </a:p>
@@ -4299,35 +4303,11 @@
             </a:pPr>
             <a:r>
               <a:rPr lang="zh-TW" altLang="en-US" dirty="0" smtClean="0"/>
-              <a:t>此專案為協助 </a:t>
-            </a:r>
-            <a:r>
-              <a:rPr lang="en-US" altLang="zh-TW" dirty="0"/>
-              <a:t>RD2 </a:t>
-            </a:r>
-            <a:r>
-              <a:rPr lang="zh-TW" altLang="en-US" dirty="0"/>
-              <a:t>站</a:t>
-            </a:r>
-            <a:r>
-              <a:rPr lang="zh-TW" altLang="en-US" dirty="0" smtClean="0"/>
-              <a:t>台 </a:t>
-            </a:r>
-            <a:r>
-              <a:rPr lang="en-US" altLang="zh-TW" dirty="0" smtClean="0"/>
-              <a:t>(</a:t>
-            </a:r>
-            <a:r>
-              <a:rPr lang="zh-TW" altLang="en-US" dirty="0" smtClean="0"/>
-              <a:t>為了前後端分離</a:t>
-            </a:r>
-            <a:r>
-              <a:rPr lang="en-US" altLang="zh-TW" dirty="0" smtClean="0"/>
-              <a:t>)</a:t>
-            </a:r>
-            <a:r>
-              <a:rPr lang="zh-TW" altLang="en-US" dirty="0" smtClean="0"/>
-              <a:t> 進行</a:t>
+              <a:t>此專案為</a:t>
+            </a:r>
+            <a:r>
+              <a:rPr lang="zh-TW" altLang="en-US" dirty="0" smtClean="0"/>
+              <a:t>協助進行</a:t>
             </a:r>
             <a:r>
               <a:rPr lang="zh-TW" altLang="en-US" dirty="0"/>
@@ -4462,13 +4442,24 @@
             </a:r>
             <a:r>
               <a:rPr lang="zh-TW" altLang="en-US" dirty="0"/>
-              <a:t>，檢查任務進度與任務</a:t>
-            </a:r>
-            <a:r>
-              <a:rPr lang="zh-TW" altLang="en-US" dirty="0" smtClean="0"/>
-              <a:t>結果</a:t>
-            </a:r>
-            <a:endParaRPr lang="en-US" altLang="zh-TW" dirty="0"/>
+              <a:t>，檢查任務</a:t>
+            </a:r>
+            <a:r>
+              <a:rPr lang="zh-TW" altLang="en-US" dirty="0" smtClean="0"/>
+              <a:t>進度 </a:t>
+            </a:r>
+            <a:r>
+              <a:rPr lang="en-US" altLang="zh-TW" dirty="0" smtClean="0"/>
+              <a:t>(</a:t>
+            </a:r>
+            <a:r>
+              <a:rPr lang="zh-TW" altLang="en-US" dirty="0" smtClean="0"/>
+              <a:t>貼標與上架任務狀態</a:t>
+            </a:r>
+            <a:r>
+              <a:rPr lang="en-US" altLang="zh-TW" dirty="0" smtClean="0"/>
+              <a:t>)</a:t>
+            </a:r>
           </a:p>
           <a:p>
             <a:pPr marL="502920" indent="-457200">
@@ -4476,24 +4467,28 @@
               <a:buAutoNum type="arabicPeriod"/>
             </a:pPr>
             <a:r>
-              <a:rPr lang="en-US" altLang="zh-TW" dirty="0" err="1"/>
+              <a:rPr lang="en-US" altLang="zh-TW" dirty="0" err="1" smtClean="0"/>
               <a:t>sample_result</a:t>
             </a:r>
             <a:r>
+              <a:rPr lang="en-US" altLang="zh-TW" dirty="0" smtClean="0"/>
+              <a:t> </a:t>
+            </a:r>
+            <a:r>
               <a:rPr lang="en-US" altLang="zh-TW" dirty="0"/>
-              <a:t> : </a:t>
+              <a:t>: </a:t>
             </a:r>
             <a:r>
               <a:rPr lang="zh-TW" altLang="en-US" dirty="0"/>
               <a:t>輸入任務</a:t>
             </a:r>
             <a:r>
-              <a:rPr lang="en-US" altLang="zh-TW" dirty="0"/>
+              <a:rPr lang="en-US" altLang="zh-TW" dirty="0" smtClean="0"/>
               <a:t>ID</a:t>
             </a:r>
             <a:r>
               <a:rPr lang="zh-TW" altLang="en-US" dirty="0" smtClean="0"/>
-              <a:t>與任務結果，</a:t>
+              <a:t>，</a:t>
             </a:r>
             <a:r>
               <a:rPr lang="zh-TW" altLang="en-US" dirty="0"/>
@@ -4948,15 +4943,7 @@
             </a:r>
             <a:r>
               <a:rPr lang="en-US" altLang="zh-TW" dirty="0" smtClean="0"/>
-              <a:t>(</a:t>
-            </a:r>
-            <a:r>
-              <a:rPr lang="en-US" altLang="zh-TW" dirty="0" smtClean="0"/>
-              <a:t>task flow</a:t>
-            </a:r>
-            <a:r>
-              <a:rPr lang="en-US" altLang="zh-TW" dirty="0" smtClean="0"/>
-              <a:t>)</a:t>
+              <a:t>(task flow)</a:t>
             </a:r>
             <a:endParaRPr lang="zh-TW" altLang="en-US" dirty="0"/>
           </a:p>
@@ -5126,15 +5113,7 @@
             </a:r>
             <a:r>
               <a:rPr lang="en-US" altLang="zh-TW" dirty="0" smtClean="0"/>
-              <a:t>(</a:t>
-            </a:r>
-            <a:r>
-              <a:rPr lang="en-US" altLang="zh-TW" dirty="0" smtClean="0"/>
-              <a:t>tasks</a:t>
-            </a:r>
-            <a:r>
-              <a:rPr lang="en-US" altLang="zh-TW" dirty="0" smtClean="0"/>
-              <a:t>)</a:t>
+              <a:t>(tasks)</a:t>
             </a:r>
             <a:endParaRPr lang="zh-TW" altLang="en-US" dirty="0"/>
           </a:p>
@@ -5164,11 +5143,7 @@
           <a:p>
             <a:r>
               <a:rPr lang="zh-TW" altLang="en-US" dirty="0" smtClean="0"/>
-              <a:t>貼標任務接收到使用者定義之資料範圍，任務會透過生成器依據時間索引批次訪問資料庫</a:t>
-            </a:r>
-            <a:r>
-              <a:rPr lang="zh-TW" altLang="en-US" dirty="0" smtClean="0"/>
-              <a:t>。</a:t>
+              <a:t>貼標任務接收到使用者定義之資料範圍，任務會透過生成器依據時間索引批次訪問資料庫。</a:t>
             </a:r>
             <a:endParaRPr lang="en-US" altLang="zh-TW" dirty="0" smtClean="0"/>
           </a:p>

</xml_diff>